<commit_message>
move.py: new function for calculating position from odometry Audio.py: new function for deconvolution
</commit_message>
<xml_diff>
--- a/Localization/old/calib/Results.pptx
+++ b/Localization/old/calib/Results.pptx
@@ -290,7 +290,7 @@
           <a:p>
             <a:fld id="{4D766042-2679-3745-9BB7-BE3F15A401BA}" type="datetimeFigureOut">
               <a:rPr lang="de-DE" smtClean="0"/>
-              <a:t>04.09.15</a:t>
+              <a:t>27.10.15</a:t>
             </a:fld>
             <a:endParaRPr lang="de-DE"/>
           </a:p>
@@ -460,7 +460,7 @@
           <a:p>
             <a:fld id="{4D766042-2679-3745-9BB7-BE3F15A401BA}" type="datetimeFigureOut">
               <a:rPr lang="de-DE" smtClean="0"/>
-              <a:t>04.09.15</a:t>
+              <a:t>27.10.15</a:t>
             </a:fld>
             <a:endParaRPr lang="de-DE"/>
           </a:p>
@@ -640,7 +640,7 @@
           <a:p>
             <a:fld id="{4D766042-2679-3745-9BB7-BE3F15A401BA}" type="datetimeFigureOut">
               <a:rPr lang="de-DE" smtClean="0"/>
-              <a:t>04.09.15</a:t>
+              <a:t>27.10.15</a:t>
             </a:fld>
             <a:endParaRPr lang="de-DE"/>
           </a:p>
@@ -810,7 +810,7 @@
           <a:p>
             <a:fld id="{4D766042-2679-3745-9BB7-BE3F15A401BA}" type="datetimeFigureOut">
               <a:rPr lang="de-DE" smtClean="0"/>
-              <a:t>04.09.15</a:t>
+              <a:t>27.10.15</a:t>
             </a:fld>
             <a:endParaRPr lang="de-DE"/>
           </a:p>
@@ -1056,7 +1056,7 @@
           <a:p>
             <a:fld id="{4D766042-2679-3745-9BB7-BE3F15A401BA}" type="datetimeFigureOut">
               <a:rPr lang="de-DE" smtClean="0"/>
-              <a:t>04.09.15</a:t>
+              <a:t>27.10.15</a:t>
             </a:fld>
             <a:endParaRPr lang="de-DE"/>
           </a:p>
@@ -1344,7 +1344,7 @@
           <a:p>
             <a:fld id="{4D766042-2679-3745-9BB7-BE3F15A401BA}" type="datetimeFigureOut">
               <a:rPr lang="de-DE" smtClean="0"/>
-              <a:t>04.09.15</a:t>
+              <a:t>27.10.15</a:t>
             </a:fld>
             <a:endParaRPr lang="de-DE"/>
           </a:p>
@@ -1766,7 +1766,7 @@
           <a:p>
             <a:fld id="{4D766042-2679-3745-9BB7-BE3F15A401BA}" type="datetimeFigureOut">
               <a:rPr lang="de-DE" smtClean="0"/>
-              <a:t>04.09.15</a:t>
+              <a:t>27.10.15</a:t>
             </a:fld>
             <a:endParaRPr lang="de-DE"/>
           </a:p>
@@ -1884,7 +1884,7 @@
           <a:p>
             <a:fld id="{4D766042-2679-3745-9BB7-BE3F15A401BA}" type="datetimeFigureOut">
               <a:rPr lang="de-DE" smtClean="0"/>
-              <a:t>04.09.15</a:t>
+              <a:t>27.10.15</a:t>
             </a:fld>
             <a:endParaRPr lang="de-DE"/>
           </a:p>
@@ -1979,7 +1979,7 @@
           <a:p>
             <a:fld id="{4D766042-2679-3745-9BB7-BE3F15A401BA}" type="datetimeFigureOut">
               <a:rPr lang="de-DE" smtClean="0"/>
-              <a:t>04.09.15</a:t>
+              <a:t>27.10.15</a:t>
             </a:fld>
             <a:endParaRPr lang="de-DE"/>
           </a:p>
@@ -2256,7 +2256,7 @@
           <a:p>
             <a:fld id="{4D766042-2679-3745-9BB7-BE3F15A401BA}" type="datetimeFigureOut">
               <a:rPr lang="de-DE" smtClean="0"/>
-              <a:t>04.09.15</a:t>
+              <a:t>27.10.15</a:t>
             </a:fld>
             <a:endParaRPr lang="de-DE"/>
           </a:p>
@@ -2509,7 +2509,7 @@
           <a:p>
             <a:fld id="{4D766042-2679-3745-9BB7-BE3F15A401BA}" type="datetimeFigureOut">
               <a:rPr lang="de-DE" smtClean="0"/>
-              <a:t>04.09.15</a:t>
+              <a:t>27.10.15</a:t>
             </a:fld>
             <a:endParaRPr lang="de-DE"/>
           </a:p>
@@ -2722,7 +2722,7 @@
           <a:p>
             <a:fld id="{4D766042-2679-3745-9BB7-BE3F15A401BA}" type="datetimeFigureOut">
               <a:rPr lang="de-DE" smtClean="0"/>
-              <a:t>04.09.15</a:t>
+              <a:t>27.10.15</a:t>
             </a:fld>
             <a:endParaRPr lang="de-DE"/>
           </a:p>
@@ -3714,7 +3714,7 @@
           <a:noFill/>
           <a:ln w="57150" cmpd="sng">
             <a:solidFill>
-              <a:schemeClr val="accent2"/>
+              <a:schemeClr val="accent6"/>
             </a:solidFill>
           </a:ln>
           <a:effectLst/>
@@ -3819,7 +3819,7 @@
           <a:noFill/>
           <a:ln w="57150" cmpd="sng">
             <a:solidFill>
-              <a:schemeClr val="accent2"/>
+              <a:schemeClr val="accent6"/>
             </a:solidFill>
           </a:ln>
           <a:effectLst/>
@@ -3925,7 +3925,7 @@
           <a:noFill/>
           <a:ln w="57150" cmpd="sng">
             <a:solidFill>
-              <a:schemeClr val="accent2"/>
+              <a:schemeClr val="accent6"/>
             </a:solidFill>
           </a:ln>
           <a:effectLst/>
@@ -4031,7 +4031,7 @@
           <a:noFill/>
           <a:ln w="57150" cmpd="sng">
             <a:solidFill>
-              <a:schemeClr val="accent2"/>
+              <a:schemeClr val="accent6"/>
             </a:solidFill>
           </a:ln>
           <a:effectLst/>
@@ -4130,6 +4130,15 @@
         <p:blipFill>
           <a:blip r:embed="rId6">
             <a:extLst>
+              <a:ext uri="{BEBA8EAE-BF5A-486C-A8C5-ECC9F3942E4B}">
+                <a14:imgProps xmlns:a14="http://schemas.microsoft.com/office/drawing/2010/main">
+                  <a14:imgLayer r:embed="rId7">
+                    <a14:imgEffect>
+                      <a14:backgroundRemoval t="10000" b="90000" l="10000" r="90000"/>
+                    </a14:imgEffect>
+                  </a14:imgLayer>
+                </a14:imgProps>
+              </a:ext>
               <a:ext uri="{28A0092B-C50C-407E-A947-70E740481C1C}">
                 <a14:useLocalDpi xmlns:a14="http://schemas.microsoft.com/office/drawing/2010/main" val="0"/>
               </a:ext>
@@ -4141,7 +4150,7 @@
         </p:blipFill>
         <p:spPr>
           <a:xfrm>
-            <a:off x="1187598" y="609601"/>
+            <a:off x="1340461" y="718588"/>
             <a:ext cx="3663468" cy="2747601"/>
           </a:xfrm>
           <a:prstGeom prst="rect">

</xml_diff>